<commit_message>
Small update to pres
</commit_message>
<xml_diff>
--- a/Dragon_Drop_Presentation.pptx
+++ b/Dragon_Drop_Presentation.pptx
@@ -25,7 +25,7 @@
     <p:sldId id="270" r:id="rId16"/>
   </p:sldIdLst>
   <p:sldSz cx="9144000" cy="5143500" type="screen16x9"/>
-  <p:notesSz cx="6858000" cy="9144000"/>
+  <p:notesSz cx="6797675" cy="9928225"/>
   <p:defaultTextStyle>
     <a:defPPr marR="0" algn="l" rtl="0">
       <a:lnSpc>
@@ -274,8 +274,8 @@
         </p:nvSpPr>
         <p:spPr>
           <a:xfrm>
-            <a:off x="381187" y="685800"/>
-            <a:ext cx="6096299" cy="3429000"/>
+            <a:off x="90488" y="744538"/>
+            <a:ext cx="6616700" cy="3722687"/>
           </a:xfrm>
           <a:custGeom>
             <a:avLst/>
@@ -315,8 +315,8 @@
         </p:nvSpPr>
         <p:spPr>
           <a:xfrm>
-            <a:off x="685800" y="4343400"/>
-            <a:ext cx="5486399" cy="4114800"/>
+            <a:off x="679768" y="4715907"/>
+            <a:ext cx="5438139" cy="4467701"/>
           </a:xfrm>
           <a:prstGeom prst="rect">
             <a:avLst/>
@@ -490,8 +490,8 @@
         </p:nvSpPr>
         <p:spPr>
           <a:xfrm>
-            <a:off x="381000" y="685800"/>
-            <a:ext cx="6096000" cy="3429000"/>
+            <a:off x="90488" y="744538"/>
+            <a:ext cx="6616700" cy="3722687"/>
           </a:xfrm>
           <a:custGeom>
             <a:avLst/>
@@ -531,8 +531,8 @@
         </p:nvSpPr>
         <p:spPr>
           <a:xfrm>
-            <a:off x="685800" y="4343400"/>
-            <a:ext cx="5486399" cy="4114800"/>
+            <a:off x="679768" y="4715907"/>
+            <a:ext cx="5438139" cy="4467701"/>
           </a:xfrm>
           <a:prstGeom prst="rect">
             <a:avLst/>
@@ -585,8 +585,8 @@
         </p:nvSpPr>
         <p:spPr>
           <a:xfrm>
-            <a:off x="381000" y="685800"/>
-            <a:ext cx="6096000" cy="3429000"/>
+            <a:off x="90488" y="744538"/>
+            <a:ext cx="6616700" cy="3722687"/>
           </a:xfrm>
           <a:custGeom>
             <a:avLst/>
@@ -626,8 +626,8 @@
         </p:nvSpPr>
         <p:spPr>
           <a:xfrm>
-            <a:off x="685800" y="4343400"/>
-            <a:ext cx="5486399" cy="4114800"/>
+            <a:off x="679768" y="4715907"/>
+            <a:ext cx="5438139" cy="4467701"/>
           </a:xfrm>
           <a:prstGeom prst="rect">
             <a:avLst/>
@@ -680,8 +680,8 @@
         </p:nvSpPr>
         <p:spPr>
           <a:xfrm>
-            <a:off x="381187" y="685800"/>
-            <a:ext cx="6096299" cy="3429000"/>
+            <a:off x="90488" y="744538"/>
+            <a:ext cx="6616700" cy="3722687"/>
           </a:xfrm>
           <a:custGeom>
             <a:avLst/>
@@ -721,8 +721,8 @@
         </p:nvSpPr>
         <p:spPr>
           <a:xfrm>
-            <a:off x="685800" y="4343400"/>
-            <a:ext cx="5486399" cy="4114800"/>
+            <a:off x="679768" y="4715907"/>
+            <a:ext cx="5438139" cy="4467701"/>
           </a:xfrm>
           <a:prstGeom prst="rect">
             <a:avLst/>
@@ -775,8 +775,8 @@
         </p:nvSpPr>
         <p:spPr>
           <a:xfrm>
-            <a:off x="381187" y="685800"/>
-            <a:ext cx="6096299" cy="3429000"/>
+            <a:off x="90488" y="744538"/>
+            <a:ext cx="6616700" cy="3722687"/>
           </a:xfrm>
           <a:custGeom>
             <a:avLst/>
@@ -816,8 +816,8 @@
         </p:nvSpPr>
         <p:spPr>
           <a:xfrm>
-            <a:off x="685800" y="4343400"/>
-            <a:ext cx="5486399" cy="4114800"/>
+            <a:off x="679768" y="4715907"/>
+            <a:ext cx="5438139" cy="4467701"/>
           </a:xfrm>
           <a:prstGeom prst="rect">
             <a:avLst/>
@@ -870,8 +870,8 @@
         </p:nvSpPr>
         <p:spPr>
           <a:xfrm>
-            <a:off x="381187" y="685800"/>
-            <a:ext cx="6096299" cy="3429000"/>
+            <a:off x="90488" y="744538"/>
+            <a:ext cx="6616700" cy="3722687"/>
           </a:xfrm>
           <a:custGeom>
             <a:avLst/>
@@ -911,8 +911,8 @@
         </p:nvSpPr>
         <p:spPr>
           <a:xfrm>
-            <a:off x="685800" y="4343400"/>
-            <a:ext cx="5486399" cy="4114800"/>
+            <a:off x="679768" y="4715907"/>
+            <a:ext cx="5438139" cy="4467701"/>
           </a:xfrm>
           <a:prstGeom prst="rect">
             <a:avLst/>
@@ -965,8 +965,8 @@
         </p:nvSpPr>
         <p:spPr>
           <a:xfrm>
-            <a:off x="381187" y="685800"/>
-            <a:ext cx="6096299" cy="3429000"/>
+            <a:off x="90488" y="744538"/>
+            <a:ext cx="6616700" cy="3722687"/>
           </a:xfrm>
           <a:custGeom>
             <a:avLst/>
@@ -1006,8 +1006,8 @@
         </p:nvSpPr>
         <p:spPr>
           <a:xfrm>
-            <a:off x="685800" y="4343400"/>
-            <a:ext cx="5486399" cy="4114800"/>
+            <a:off x="679768" y="4715907"/>
+            <a:ext cx="5438139" cy="4467701"/>
           </a:xfrm>
           <a:prstGeom prst="rect">
             <a:avLst/>
@@ -1060,8 +1060,8 @@
         </p:nvSpPr>
         <p:spPr>
           <a:xfrm>
-            <a:off x="381187" y="685800"/>
-            <a:ext cx="6096299" cy="3429000"/>
+            <a:off x="90488" y="744538"/>
+            <a:ext cx="6616700" cy="3722687"/>
           </a:xfrm>
           <a:custGeom>
             <a:avLst/>
@@ -1101,8 +1101,8 @@
         </p:nvSpPr>
         <p:spPr>
           <a:xfrm>
-            <a:off x="685800" y="4343400"/>
-            <a:ext cx="5486399" cy="4114800"/>
+            <a:off x="679768" y="4715907"/>
+            <a:ext cx="5438139" cy="4467701"/>
           </a:xfrm>
           <a:prstGeom prst="rect">
             <a:avLst/>
@@ -1155,8 +1155,8 @@
         </p:nvSpPr>
         <p:spPr>
           <a:xfrm>
-            <a:off x="381187" y="685800"/>
-            <a:ext cx="6096299" cy="3429000"/>
+            <a:off x="90488" y="744538"/>
+            <a:ext cx="6616700" cy="3722687"/>
           </a:xfrm>
           <a:custGeom>
             <a:avLst/>
@@ -1196,8 +1196,8 @@
         </p:nvSpPr>
         <p:spPr>
           <a:xfrm>
-            <a:off x="685800" y="4343400"/>
-            <a:ext cx="5486399" cy="4114800"/>
+            <a:off x="679768" y="4715907"/>
+            <a:ext cx="5438139" cy="4467701"/>
           </a:xfrm>
           <a:prstGeom prst="rect">
             <a:avLst/>
@@ -1250,8 +1250,8 @@
         </p:nvSpPr>
         <p:spPr>
           <a:xfrm>
-            <a:off x="381000" y="685800"/>
-            <a:ext cx="6096000" cy="3429000"/>
+            <a:off x="90488" y="744538"/>
+            <a:ext cx="6616700" cy="3722687"/>
           </a:xfrm>
           <a:custGeom>
             <a:avLst/>
@@ -1291,8 +1291,8 @@
         </p:nvSpPr>
         <p:spPr>
           <a:xfrm>
-            <a:off x="685800" y="4343400"/>
-            <a:ext cx="5486399" cy="4114800"/>
+            <a:off x="679768" y="4715907"/>
+            <a:ext cx="5438139" cy="4467701"/>
           </a:xfrm>
           <a:prstGeom prst="rect">
             <a:avLst/>
@@ -1345,8 +1345,8 @@
         </p:nvSpPr>
         <p:spPr>
           <a:xfrm>
-            <a:off x="381000" y="685800"/>
-            <a:ext cx="6096000" cy="3429000"/>
+            <a:off x="90488" y="744538"/>
+            <a:ext cx="6616700" cy="3722687"/>
           </a:xfrm>
           <a:custGeom>
             <a:avLst/>
@@ -1386,8 +1386,8 @@
         </p:nvSpPr>
         <p:spPr>
           <a:xfrm>
-            <a:off x="685800" y="4343400"/>
-            <a:ext cx="5486399" cy="4114800"/>
+            <a:off x="679768" y="4715907"/>
+            <a:ext cx="5438139" cy="4467701"/>
           </a:xfrm>
           <a:prstGeom prst="rect">
             <a:avLst/>
@@ -1440,8 +1440,8 @@
         </p:nvSpPr>
         <p:spPr>
           <a:xfrm>
-            <a:off x="381187" y="685800"/>
-            <a:ext cx="6096299" cy="3429000"/>
+            <a:off x="90488" y="744538"/>
+            <a:ext cx="6616700" cy="3722687"/>
           </a:xfrm>
           <a:custGeom>
             <a:avLst/>
@@ -1481,8 +1481,8 @@
         </p:nvSpPr>
         <p:spPr>
           <a:xfrm>
-            <a:off x="685800" y="4343400"/>
-            <a:ext cx="5486399" cy="4114800"/>
+            <a:off x="679768" y="4715907"/>
+            <a:ext cx="5438139" cy="4467701"/>
           </a:xfrm>
           <a:prstGeom prst="rect">
             <a:avLst/>
@@ -1535,8 +1535,8 @@
         </p:nvSpPr>
         <p:spPr>
           <a:xfrm>
-            <a:off x="381187" y="685800"/>
-            <a:ext cx="6096299" cy="3429000"/>
+            <a:off x="90488" y="744538"/>
+            <a:ext cx="6616700" cy="3722687"/>
           </a:xfrm>
           <a:custGeom>
             <a:avLst/>
@@ -1576,8 +1576,8 @@
         </p:nvSpPr>
         <p:spPr>
           <a:xfrm>
-            <a:off x="685800" y="4343400"/>
-            <a:ext cx="5486399" cy="4114800"/>
+            <a:off x="679768" y="4715907"/>
+            <a:ext cx="5438139" cy="4467701"/>
           </a:xfrm>
           <a:prstGeom prst="rect">
             <a:avLst/>
@@ -1630,8 +1630,8 @@
         </p:nvSpPr>
         <p:spPr>
           <a:xfrm>
-            <a:off x="381187" y="685800"/>
-            <a:ext cx="6096299" cy="3429000"/>
+            <a:off x="90488" y="744538"/>
+            <a:ext cx="6616700" cy="3722687"/>
           </a:xfrm>
           <a:custGeom>
             <a:avLst/>
@@ -1671,8 +1671,8 @@
         </p:nvSpPr>
         <p:spPr>
           <a:xfrm>
-            <a:off x="685800" y="4343400"/>
-            <a:ext cx="5486399" cy="4114800"/>
+            <a:off x="679768" y="4715907"/>
+            <a:ext cx="5438139" cy="4467701"/>
           </a:xfrm>
           <a:prstGeom prst="rect">
             <a:avLst/>
@@ -1725,8 +1725,8 @@
         </p:nvSpPr>
         <p:spPr>
           <a:xfrm>
-            <a:off x="381187" y="685800"/>
-            <a:ext cx="6096299" cy="3429000"/>
+            <a:off x="90488" y="744538"/>
+            <a:ext cx="6616700" cy="3722687"/>
           </a:xfrm>
           <a:custGeom>
             <a:avLst/>
@@ -1766,8 +1766,8 @@
         </p:nvSpPr>
         <p:spPr>
           <a:xfrm>
-            <a:off x="685800" y="4343400"/>
-            <a:ext cx="5486399" cy="4114800"/>
+            <a:off x="679768" y="4715907"/>
+            <a:ext cx="5438139" cy="4467701"/>
           </a:xfrm>
           <a:prstGeom prst="rect">
             <a:avLst/>
@@ -1820,8 +1820,8 @@
         </p:nvSpPr>
         <p:spPr>
           <a:xfrm>
-            <a:off x="381187" y="685800"/>
-            <a:ext cx="6096299" cy="3429000"/>
+            <a:off x="90488" y="744538"/>
+            <a:ext cx="6616700" cy="3722687"/>
           </a:xfrm>
           <a:custGeom>
             <a:avLst/>
@@ -1861,8 +1861,8 @@
         </p:nvSpPr>
         <p:spPr>
           <a:xfrm>
-            <a:off x="685800" y="4343400"/>
-            <a:ext cx="5486399" cy="4114800"/>
+            <a:off x="679768" y="4715907"/>
+            <a:ext cx="5438139" cy="4467701"/>
           </a:xfrm>
           <a:prstGeom prst="rect">
             <a:avLst/>
@@ -4152,7 +4152,7 @@
               <a:t> </a:t>
             </a:r>
             <a:r>
-              <a:rPr lang="en-GB" sz="1600" b="1" dirty="0" err="1">
+              <a:rPr lang="en-GB" sz="1600" b="1" dirty="0">
                 <a:solidFill>
                   <a:srgbClr val="000000"/>
                 </a:solidFill>
@@ -4161,20 +4161,7 @@
                 <a:cs typeface="Cambria"/>
                 <a:sym typeface="Cambria"/>
               </a:rPr>
-              <a:t>Maro</a:t>
-            </a:r>
-            <a:r>
-              <a:rPr lang="en-GB" sz="1600" b="1" dirty="0" err="1">
-                <a:solidFill>
-                  <a:srgbClr val="000000"/>
-                </a:solidFill>
-                <a:latin typeface="Cambria"/>
-                <a:ea typeface="Cambria"/>
-                <a:cs typeface="Cambria"/>
-                <a:sym typeface="Cambria"/>
-                <a:hlinkClick r:id="rId3"/>
-              </a:rPr>
-              <a:t>ń</a:t>
+              <a:t>Maroń</a:t>
             </a:r>
             <a:r>
               <a:rPr lang="en-GB" sz="1600" b="1" dirty="0">
@@ -4265,7 +4252,7 @@
               <a:ea typeface="Cambria"/>
               <a:cs typeface="Cambria"/>
               <a:sym typeface="Cambria"/>
-              <a:hlinkClick r:id="rId4"/>
+              <a:hlinkClick r:id="rId3"/>
             </a:endParaRPr>
           </a:p>
         </p:txBody>
@@ -4277,7 +4264,7 @@
           <p:nvPr/>
         </p:nvPicPr>
         <p:blipFill>
-          <a:blip r:embed="rId5"/>
+          <a:blip r:embed="rId4"/>
           <a:stretch>
             <a:fillRect/>
           </a:stretch>
@@ -5131,7 +5118,7 @@
               <a:buAutoNum type="arabicPeriod"/>
             </a:pPr>
             <a:r>
-              <a:rPr lang="en-GB" sz="1800">
+              <a:rPr lang="en-GB" sz="1800" dirty="0">
                 <a:latin typeface="Cambria"/>
                 <a:ea typeface="Cambria"/>
                 <a:cs typeface="Cambria"/>
@@ -5141,7 +5128,7 @@
             </a:r>
           </a:p>
           <a:p>
-            <a:endParaRPr lang="en-GB" sz="1800">
+            <a:endParaRPr lang="en-GB" sz="1800" dirty="0">
               <a:latin typeface="Cambria"/>
               <a:ea typeface="Cambria"/>
               <a:cs typeface="Cambria"/>
@@ -5149,22 +5136,29 @@
             </a:endParaRPr>
           </a:p>
           <a:p>
-            <a:pPr marL="457200" lvl="0" indent="-342900" rtl="0">
+            <a:pPr marL="114300" lvl="0" indent="0" rtl="0">
               <a:buClr>
                 <a:schemeClr val="dk1"/>
               </a:buClr>
               <a:buSzPct val="100000"/>
-              <a:buFont typeface="Cambria"/>
-              <a:buAutoNum type="arabicPeriod"/>
             </a:pPr>
             <a:r>
-              <a:rPr lang="en-GB" sz="1800">
+              <a:rPr lang="en-GB" sz="1800" dirty="0" smtClean="0">
                 <a:latin typeface="Cambria"/>
                 <a:ea typeface="Cambria"/>
                 <a:cs typeface="Cambria"/>
                 <a:sym typeface="Cambria"/>
               </a:rPr>
-              <a:t>Ranking filter applied to results to increase suitability of response:</a:t>
+              <a:t>2. Ranking </a:t>
+            </a:r>
+            <a:r>
+              <a:rPr lang="en-GB" sz="1800" dirty="0">
+                <a:latin typeface="Cambria"/>
+                <a:ea typeface="Cambria"/>
+                <a:cs typeface="Cambria"/>
+                <a:sym typeface="Cambria"/>
+              </a:rPr>
+              <a:t>filter applied to results to increase suitability of response:</a:t>
             </a:r>
           </a:p>
           <a:p>
@@ -5177,7 +5171,7 @@
               <a:buAutoNum type="alphaLcPeriod"/>
             </a:pPr>
             <a:r>
-              <a:rPr lang="en-GB" sz="1800">
+              <a:rPr lang="en-GB" sz="1800" dirty="0">
                 <a:latin typeface="Cambria"/>
                 <a:ea typeface="Cambria"/>
                 <a:cs typeface="Cambria"/>
@@ -5196,7 +5190,7 @@
               <a:buAutoNum type="alphaLcPeriod"/>
             </a:pPr>
             <a:r>
-              <a:rPr lang="en-GB" sz="1800">
+              <a:rPr lang="en-GB" sz="1800" dirty="0">
                 <a:latin typeface="Cambria"/>
                 <a:ea typeface="Cambria"/>
                 <a:cs typeface="Cambria"/>
@@ -5215,7 +5209,7 @@
               <a:buAutoNum type="alphaLcPeriod"/>
             </a:pPr>
             <a:r>
-              <a:rPr lang="en-GB" sz="1800">
+              <a:rPr lang="en-GB" sz="1800" dirty="0">
                 <a:latin typeface="Cambria"/>
                 <a:ea typeface="Cambria"/>
                 <a:cs typeface="Cambria"/>
@@ -5225,7 +5219,7 @@
             </a:r>
           </a:p>
           <a:p>
-            <a:endParaRPr lang="en-GB" sz="1800">
+            <a:endParaRPr lang="en-GB" sz="1800" dirty="0">
               <a:latin typeface="Cambria"/>
               <a:ea typeface="Cambria"/>
               <a:cs typeface="Cambria"/>
@@ -5233,26 +5227,33 @@
             </a:endParaRPr>
           </a:p>
           <a:p>
-            <a:pPr marL="457200" lvl="0" indent="-342900" rtl="0">
+            <a:pPr marL="114300" lvl="0" indent="0" rtl="0">
               <a:buClr>
                 <a:schemeClr val="dk1"/>
               </a:buClr>
               <a:buSzPct val="100000"/>
-              <a:buFont typeface="Cambria"/>
-              <a:buAutoNum type="arabicPeriod"/>
             </a:pPr>
             <a:r>
-              <a:rPr lang="en-GB" sz="1800">
+              <a:rPr lang="en-GB" sz="1800" dirty="0" smtClean="0">
                 <a:latin typeface="Cambria"/>
                 <a:ea typeface="Cambria"/>
                 <a:cs typeface="Cambria"/>
                 <a:sym typeface="Cambria"/>
               </a:rPr>
-              <a:t>Intuitive, uncomplicated interface - folder structure, drag and drop to store/organise bookmarks/folders</a:t>
-            </a:r>
-          </a:p>
-          <a:p>
-            <a:endParaRPr lang="en-GB" sz="1800">
+              <a:t>3. Intuitive</a:t>
+            </a:r>
+            <a:r>
+              <a:rPr lang="en-GB" sz="1800" dirty="0">
+                <a:latin typeface="Cambria"/>
+                <a:ea typeface="Cambria"/>
+                <a:cs typeface="Cambria"/>
+                <a:sym typeface="Cambria"/>
+              </a:rPr>
+              <a:t>, uncomplicated interface - folder structure, drag and drop to store/organise bookmarks/folders</a:t>
+            </a:r>
+          </a:p>
+          <a:p>
+            <a:endParaRPr lang="en-GB" sz="1800" dirty="0">
               <a:latin typeface="Cambria"/>
               <a:ea typeface="Cambria"/>
               <a:cs typeface="Cambria"/>
@@ -5260,26 +5261,33 @@
             </a:endParaRPr>
           </a:p>
           <a:p>
-            <a:pPr marL="457200" lvl="0" indent="-342900" rtl="0">
+            <a:pPr marL="114300" lvl="0" indent="0" rtl="0">
               <a:buClr>
                 <a:schemeClr val="dk1"/>
               </a:buClr>
               <a:buSzPct val="100000"/>
-              <a:buFont typeface="Cambria"/>
-              <a:buAutoNum type="arabicPeriod"/>
             </a:pPr>
             <a:r>
-              <a:rPr lang="en-GB" sz="1800">
+              <a:rPr lang="en-GB" sz="1800" dirty="0" smtClean="0">
                 <a:latin typeface="Cambria"/>
                 <a:ea typeface="Cambria"/>
                 <a:cs typeface="Cambria"/>
                 <a:sym typeface="Cambria"/>
               </a:rPr>
-              <a:t>DRAGONS!</a:t>
-            </a:r>
-          </a:p>
-          <a:p>
-            <a:endParaRPr lang="en-GB" sz="1800">
+              <a:t>4. DRAGONS</a:t>
+            </a:r>
+            <a:r>
+              <a:rPr lang="en-GB" sz="1800" dirty="0">
+                <a:latin typeface="Cambria"/>
+                <a:ea typeface="Cambria"/>
+                <a:cs typeface="Cambria"/>
+                <a:sym typeface="Cambria"/>
+              </a:rPr>
+              <a:t>!</a:t>
+            </a:r>
+          </a:p>
+          <a:p>
+            <a:endParaRPr lang="en-GB" sz="1800" dirty="0">
               <a:latin typeface="Cambria"/>
               <a:ea typeface="Cambria"/>
               <a:cs typeface="Cambria"/>
@@ -5287,7 +5295,7 @@
             </a:endParaRPr>
           </a:p>
           <a:p>
-            <a:endParaRPr lang="en-GB" sz="1800">
+            <a:endParaRPr lang="en-GB" sz="1800" dirty="0">
               <a:latin typeface="Cambria"/>
               <a:ea typeface="Cambria"/>
               <a:cs typeface="Cambria"/>
@@ -5987,16 +5995,7 @@
                 <a:cs typeface="Cambria"/>
                 <a:sym typeface="Cambria"/>
               </a:rPr>
-              <a:t>and t</a:t>
-            </a:r>
-            <a:r>
-              <a:rPr lang="en-GB" sz="1600" dirty="0" smtClean="0">
-                <a:latin typeface="Cambria"/>
-                <a:ea typeface="Cambria"/>
-                <a:cs typeface="Cambria"/>
-                <a:sym typeface="Cambria"/>
-              </a:rPr>
-              <a:t>op </a:t>
+              <a:t>and top </a:t>
             </a:r>
             <a:r>
               <a:rPr lang="en-GB" sz="1600" dirty="0">

</xml_diff>